<commit_message>
Presentation updated for GXUGSA
</commit_message>
<xml_diff>
--- a/24062016/Presentations/Introduction to Xamarin.pptx
+++ b/24062016/Presentations/Introduction to Xamarin.pptx
@@ -3390,19 +3390,7 @@
                 <a:cs typeface="Quattrocento Sans"/>
                 <a:sym typeface="Quattrocento Sans"/>
               </a:rPr>
-              <a:t> Dev Days South Africa! #</a:t>
-            </a:r>
-            <a:r>
-              <a:rPr lang="en-US" sz="6600" b="0" i="0" u="none" strike="noStrike" cap="none" dirty="0" err="1">
-                <a:solidFill>
-                  <a:srgbClr val="18B4E2"/>
-                </a:solidFill>
-                <a:latin typeface="Quattrocento Sans"/>
-                <a:ea typeface="Quattrocento Sans"/>
-                <a:cs typeface="Quattrocento Sans"/>
-                <a:sym typeface="Quattrocento Sans"/>
-              </a:rPr>
-              <a:t>XamarinDevDays</a:t>
+              <a:t> Dev Days South Africa! </a:t>
             </a:r>
             <a:br>
               <a:rPr lang="en-US" sz="6600" b="0" i="0" u="none" strike="noStrike" cap="none" dirty="0">
@@ -3435,7 +3423,7 @@
         </p:nvSpPr>
         <p:spPr>
           <a:xfrm>
-            <a:off x="5897097" y="11377052"/>
+            <a:off x="2336817" y="11180949"/>
             <a:ext cx="11794190" cy="769441"/>
           </a:xfrm>
           <a:prstGeom prst="rect">
@@ -3468,8 +3456,8 @@
         </p:nvSpPr>
         <p:spPr>
           <a:xfrm>
-            <a:off x="3601429" y="3844666"/>
-            <a:ext cx="18265588" cy="5078313"/>
+            <a:off x="2336817" y="4629496"/>
+            <a:ext cx="19710466" cy="4832092"/>
           </a:xfrm>
           <a:prstGeom prst="rect">
             <a:avLst/>
@@ -3483,433 +3471,327 @@
           <a:lstStyle/>
           <a:p>
             <a:r>
-              <a:rPr lang="en-US" sz="3600" b="0" i="0" dirty="0">
-                <a:solidFill>
-                  <a:srgbClr val="76828A"/>
+              <a:rPr lang="en-US" sz="4400" b="0" i="0" dirty="0">
+                <a:solidFill>
+                  <a:schemeClr val="tx1"/>
                 </a:solidFill>
                 <a:effectLst/>
-                <a:latin typeface="WeblySleek UI"/>
-              </a:rPr>
-              <a:t>9:00 </a:t>
-            </a:r>
-            <a:r>
-              <a:rPr lang="en-US" sz="3600" b="0" i="0" dirty="0">
-                <a:solidFill>
-                  <a:srgbClr val="9AA4AB"/>
+                <a:latin typeface="Courier New" panose="02070309020205020404" pitchFamily="49" charset="0"/>
+                <a:cs typeface="Courier New" panose="02070309020205020404" pitchFamily="49" charset="0"/>
+              </a:rPr>
+              <a:t>09:00 AM – 09:30 AM</a:t>
+            </a:r>
+            <a:r>
+              <a:rPr lang="en-US" sz="4400" dirty="0">
+                <a:solidFill>
+                  <a:schemeClr val="tx1"/>
+                </a:solidFill>
+                <a:latin typeface="Courier New" panose="02070309020205020404" pitchFamily="49" charset="0"/>
+                <a:cs typeface="Courier New" panose="02070309020205020404" pitchFamily="49" charset="0"/>
+              </a:rPr>
+              <a:t> 	</a:t>
+            </a:r>
+            <a:r>
+              <a:rPr lang="en-US" sz="4400" b="0" i="0" dirty="0">
+                <a:solidFill>
+                  <a:schemeClr val="tx1"/>
                 </a:solidFill>
                 <a:effectLst/>
-                <a:latin typeface="WeblySleek UI"/>
-              </a:rPr>
-              <a:t>AM</a:t>
-            </a:r>
-            <a:r>
-              <a:rPr lang="en-US" sz="3600" b="0" i="0" dirty="0">
-                <a:solidFill>
-                  <a:srgbClr val="76828A"/>
+                <a:latin typeface="Courier New" panose="02070309020205020404" pitchFamily="49" charset="0"/>
+                <a:cs typeface="Courier New" panose="02070309020205020404" pitchFamily="49" charset="0"/>
+              </a:rPr>
+              <a:t>Registration</a:t>
+            </a:r>
+          </a:p>
+          <a:p>
+            <a:r>
+              <a:rPr lang="en-US" sz="4400" b="0" i="0" dirty="0">
+                <a:solidFill>
+                  <a:schemeClr val="tx1"/>
                 </a:solidFill>
                 <a:effectLst/>
-                <a:latin typeface="WeblySleek UI"/>
-              </a:rPr>
-              <a:t> – 9:30 </a:t>
-            </a:r>
-            <a:r>
-              <a:rPr lang="en-US" sz="3600" b="0" i="0" dirty="0">
-                <a:solidFill>
-                  <a:srgbClr val="9AA4AB"/>
+                <a:latin typeface="Courier New" panose="02070309020205020404" pitchFamily="49" charset="0"/>
+                <a:cs typeface="Courier New" panose="02070309020205020404" pitchFamily="49" charset="0"/>
+              </a:rPr>
+              <a:t>09:30 AM – 10:10 AM</a:t>
+            </a:r>
+            <a:r>
+              <a:rPr lang="en-US" sz="4400" dirty="0">
+                <a:solidFill>
+                  <a:schemeClr val="tx1"/>
+                </a:solidFill>
+                <a:latin typeface="Courier New" panose="02070309020205020404" pitchFamily="49" charset="0"/>
+                <a:cs typeface="Courier New" panose="02070309020205020404" pitchFamily="49" charset="0"/>
+              </a:rPr>
+              <a:t> 	</a:t>
+            </a:r>
+            <a:r>
+              <a:rPr lang="en-US" sz="4400" b="0" i="0" dirty="0">
+                <a:solidFill>
+                  <a:schemeClr val="tx1"/>
                 </a:solidFill>
                 <a:effectLst/>
-                <a:latin typeface="WeblySleek UI"/>
-              </a:rPr>
-              <a:t>AM</a:t>
-            </a:r>
-            <a:r>
-              <a:rPr lang="en-US" sz="3600" dirty="0">
-                <a:solidFill>
-                  <a:srgbClr val="76828A"/>
-                </a:solidFill>
-                <a:latin typeface="WeblySleek UI"/>
-              </a:rPr>
-              <a:t> </a:t>
-            </a:r>
-            <a:r>
-              <a:rPr lang="en-US" sz="3600" b="0" i="0" dirty="0">
-                <a:solidFill>
-                  <a:srgbClr val="4E5758"/>
+                <a:latin typeface="Courier New" panose="02070309020205020404" pitchFamily="49" charset="0"/>
+                <a:cs typeface="Courier New" panose="02070309020205020404" pitchFamily="49" charset="0"/>
+              </a:rPr>
+              <a:t>Intro </a:t>
+            </a:r>
+            <a:r>
+              <a:rPr lang="en-US" sz="4400" b="0" i="0" dirty="0" err="1">
+                <a:solidFill>
+                  <a:schemeClr val="tx1"/>
                 </a:solidFill>
                 <a:effectLst/>
-                <a:latin typeface="WeblySleek UI"/>
-              </a:rPr>
-              <a:t>Registration</a:t>
-            </a:r>
-          </a:p>
-          <a:p>
-            <a:r>
-              <a:rPr lang="en-US" sz="3600" b="0" i="0" dirty="0">
-                <a:solidFill>
-                  <a:srgbClr val="76828A"/>
+                <a:latin typeface="Courier New" panose="02070309020205020404" pitchFamily="49" charset="0"/>
+                <a:cs typeface="Courier New" panose="02070309020205020404" pitchFamily="49" charset="0"/>
+              </a:rPr>
+              <a:t>Xamarin</a:t>
+            </a:r>
+            <a:r>
+              <a:rPr lang="en-US" sz="4400" b="0" i="0" dirty="0">
+                <a:solidFill>
+                  <a:schemeClr val="tx1"/>
                 </a:solidFill>
                 <a:effectLst/>
-                <a:latin typeface="WeblySleek UI"/>
-              </a:rPr>
-              <a:t>9:30 </a:t>
-            </a:r>
-            <a:r>
-              <a:rPr lang="en-US" sz="3600" b="0" i="0" dirty="0">
-                <a:solidFill>
-                  <a:srgbClr val="9AA4AB"/>
+                <a:latin typeface="Courier New" panose="02070309020205020404" pitchFamily="49" charset="0"/>
+                <a:cs typeface="Courier New" panose="02070309020205020404" pitchFamily="49" charset="0"/>
+              </a:rPr>
+              <a:t> presentation</a:t>
+            </a:r>
+          </a:p>
+          <a:p>
+            <a:r>
+              <a:rPr lang="en-US" sz="4400" b="0" i="0" dirty="0">
+                <a:solidFill>
+                  <a:schemeClr val="tx1"/>
                 </a:solidFill>
                 <a:effectLst/>
-                <a:latin typeface="WeblySleek UI"/>
-              </a:rPr>
-              <a:t>AM</a:t>
-            </a:r>
-            <a:r>
-              <a:rPr lang="en-US" sz="3600" b="0" i="0" dirty="0">
-                <a:solidFill>
-                  <a:srgbClr val="76828A"/>
+                <a:latin typeface="Courier New" panose="02070309020205020404" pitchFamily="49" charset="0"/>
+                <a:cs typeface="Courier New" panose="02070309020205020404" pitchFamily="49" charset="0"/>
+              </a:rPr>
+              <a:t>10:20 AM – 11:00 AM</a:t>
+            </a:r>
+            <a:r>
+              <a:rPr lang="en-US" sz="4400" dirty="0">
+                <a:solidFill>
+                  <a:schemeClr val="tx1"/>
+                </a:solidFill>
+                <a:latin typeface="Courier New" panose="02070309020205020404" pitchFamily="49" charset="0"/>
+                <a:cs typeface="Courier New" panose="02070309020205020404" pitchFamily="49" charset="0"/>
+              </a:rPr>
+              <a:t> 	</a:t>
+            </a:r>
+            <a:r>
+              <a:rPr lang="en-US" sz="4400" b="0" i="0" dirty="0">
+                <a:solidFill>
+                  <a:schemeClr val="tx1"/>
                 </a:solidFill>
                 <a:effectLst/>
-                <a:latin typeface="WeblySleek UI"/>
-              </a:rPr>
-              <a:t> – 10:10 </a:t>
-            </a:r>
-            <a:r>
-              <a:rPr lang="en-US" sz="3600" b="0" i="0" dirty="0">
-                <a:solidFill>
-                  <a:srgbClr val="9AA4AB"/>
+                <a:latin typeface="Courier New" panose="02070309020205020404" pitchFamily="49" charset="0"/>
+                <a:cs typeface="Courier New" panose="02070309020205020404" pitchFamily="49" charset="0"/>
+              </a:rPr>
+              <a:t>Cross-platform </a:t>
+            </a:r>
+            <a:r>
+              <a:rPr lang="en-US" sz="4400" b="0" i="0" dirty="0" err="1">
+                <a:solidFill>
+                  <a:schemeClr val="tx1"/>
                 </a:solidFill>
                 <a:effectLst/>
-                <a:latin typeface="WeblySleek UI"/>
-              </a:rPr>
-              <a:t>AM</a:t>
-            </a:r>
-            <a:r>
-              <a:rPr lang="en-US" sz="3600" dirty="0">
-                <a:solidFill>
-                  <a:srgbClr val="76828A"/>
-                </a:solidFill>
-                <a:latin typeface="WeblySleek UI"/>
-              </a:rPr>
-              <a:t> </a:t>
-            </a:r>
-            <a:r>
-              <a:rPr lang="en-US" sz="3600" b="0" i="0" dirty="0">
-                <a:solidFill>
-                  <a:srgbClr val="4E5758"/>
+                <a:latin typeface="Courier New" panose="02070309020205020404" pitchFamily="49" charset="0"/>
+                <a:cs typeface="Courier New" panose="02070309020205020404" pitchFamily="49" charset="0"/>
+              </a:rPr>
+              <a:t>Xamarin</a:t>
+            </a:r>
+            <a:r>
+              <a:rPr lang="en-US" sz="4400" b="0" i="0" dirty="0">
+                <a:solidFill>
+                  <a:schemeClr val="tx1"/>
                 </a:solidFill>
                 <a:effectLst/>
-                <a:latin typeface="WeblySleek UI"/>
-              </a:rPr>
-              <a:t>Intro </a:t>
-            </a:r>
-            <a:r>
-              <a:rPr lang="en-US" sz="3600" b="0" i="0" dirty="0" err="1">
-                <a:solidFill>
-                  <a:srgbClr val="4E5758"/>
+                <a:latin typeface="Courier New" panose="02070309020205020404" pitchFamily="49" charset="0"/>
+                <a:cs typeface="Courier New" panose="02070309020205020404" pitchFamily="49" charset="0"/>
+              </a:rPr>
+              <a:t> presentation</a:t>
+            </a:r>
+          </a:p>
+          <a:p>
+            <a:r>
+              <a:rPr lang="en-US" sz="4400" b="0" i="0" dirty="0">
+                <a:solidFill>
+                  <a:schemeClr val="tx1"/>
                 </a:solidFill>
                 <a:effectLst/>
-                <a:latin typeface="WeblySleek UI"/>
+                <a:latin typeface="Courier New" panose="02070309020205020404" pitchFamily="49" charset="0"/>
+                <a:cs typeface="Courier New" panose="02070309020205020404" pitchFamily="49" charset="0"/>
+              </a:rPr>
+              <a:t>11:10 AM – 11:50 AM</a:t>
+            </a:r>
+            <a:r>
+              <a:rPr lang="en-US" sz="4400" dirty="0">
+                <a:solidFill>
+                  <a:schemeClr val="tx1"/>
+                </a:solidFill>
+                <a:latin typeface="Courier New" panose="02070309020205020404" pitchFamily="49" charset="0"/>
+                <a:cs typeface="Courier New" panose="02070309020205020404" pitchFamily="49" charset="0"/>
+              </a:rPr>
+              <a:t> 	</a:t>
+            </a:r>
+            <a:r>
+              <a:rPr lang="en-US" sz="4400" b="0" i="0" dirty="0">
+                <a:solidFill>
+                  <a:schemeClr val="tx1"/>
+                </a:solidFill>
+                <a:effectLst/>
+                <a:latin typeface="Courier New" panose="02070309020205020404" pitchFamily="49" charset="0"/>
+                <a:cs typeface="Courier New" panose="02070309020205020404" pitchFamily="49" charset="0"/>
+              </a:rPr>
+              <a:t>Cloud </a:t>
+            </a:r>
+            <a:r>
+              <a:rPr lang="en-US" sz="4400" b="0" i="0" dirty="0" err="1">
+                <a:solidFill>
+                  <a:schemeClr val="tx1"/>
+                </a:solidFill>
+                <a:effectLst/>
+                <a:latin typeface="Courier New" panose="02070309020205020404" pitchFamily="49" charset="0"/>
+                <a:cs typeface="Courier New" panose="02070309020205020404" pitchFamily="49" charset="0"/>
               </a:rPr>
               <a:t>Xamarin</a:t>
             </a:r>
             <a:r>
-              <a:rPr lang="en-US" sz="3600" b="0" i="0" dirty="0">
-                <a:solidFill>
-                  <a:srgbClr val="4E5758"/>
+              <a:rPr lang="en-US" sz="4400" b="0" i="0" dirty="0">
+                <a:solidFill>
+                  <a:schemeClr val="tx1"/>
                 </a:solidFill>
                 <a:effectLst/>
-                <a:latin typeface="WeblySleek UI"/>
+                <a:latin typeface="Courier New" panose="02070309020205020404" pitchFamily="49" charset="0"/>
+                <a:cs typeface="Courier New" panose="02070309020205020404" pitchFamily="49" charset="0"/>
               </a:rPr>
               <a:t> presentation</a:t>
             </a:r>
           </a:p>
           <a:p>
             <a:r>
-              <a:rPr lang="en-US" sz="3600" b="0" i="0" dirty="0">
-                <a:solidFill>
-                  <a:srgbClr val="76828A"/>
+              <a:rPr lang="en-US" sz="4400" b="0" i="0" dirty="0">
+                <a:solidFill>
+                  <a:schemeClr val="tx1"/>
                 </a:solidFill>
                 <a:effectLst/>
-                <a:latin typeface="WeblySleek UI"/>
-              </a:rPr>
-              <a:t>10:20 </a:t>
-            </a:r>
-            <a:r>
-              <a:rPr lang="en-US" sz="3600" b="0" i="0" dirty="0">
-                <a:solidFill>
-                  <a:srgbClr val="9AA4AB"/>
+                <a:latin typeface="Courier New" panose="02070309020205020404" pitchFamily="49" charset="0"/>
+                <a:cs typeface="Courier New" panose="02070309020205020404" pitchFamily="49" charset="0"/>
+              </a:rPr>
+              <a:t>12:00 PM – 13:00 PM</a:t>
+            </a:r>
+            <a:r>
+              <a:rPr lang="en-US" sz="4400" dirty="0">
+                <a:solidFill>
+                  <a:schemeClr val="tx1"/>
+                </a:solidFill>
+                <a:latin typeface="Courier New" panose="02070309020205020404" pitchFamily="49" charset="0"/>
+                <a:cs typeface="Courier New" panose="02070309020205020404" pitchFamily="49" charset="0"/>
+              </a:rPr>
+              <a:t> 	</a:t>
+            </a:r>
+            <a:r>
+              <a:rPr lang="en-US" sz="4400" b="0" i="0" dirty="0">
+                <a:solidFill>
+                  <a:schemeClr val="tx1"/>
                 </a:solidFill>
                 <a:effectLst/>
-                <a:latin typeface="WeblySleek UI"/>
-              </a:rPr>
-              <a:t>AM</a:t>
-            </a:r>
-            <a:r>
-              <a:rPr lang="en-US" sz="3600" b="0" i="0" dirty="0">
-                <a:solidFill>
-                  <a:srgbClr val="76828A"/>
+                <a:latin typeface="Courier New" panose="02070309020205020404" pitchFamily="49" charset="0"/>
+                <a:cs typeface="Courier New" panose="02070309020205020404" pitchFamily="49" charset="0"/>
+              </a:rPr>
+              <a:t>Lunch </a:t>
+            </a:r>
+          </a:p>
+          <a:p>
+            <a:r>
+              <a:rPr lang="en-US" sz="4400" b="0" i="0" dirty="0">
+                <a:solidFill>
+                  <a:schemeClr val="tx1"/>
                 </a:solidFill>
                 <a:effectLst/>
-                <a:latin typeface="WeblySleek UI"/>
-              </a:rPr>
-              <a:t> – 11:00 </a:t>
-            </a:r>
-            <a:r>
-              <a:rPr lang="en-US" sz="3600" b="0" i="0" dirty="0">
-                <a:solidFill>
-                  <a:srgbClr val="9AA4AB"/>
+                <a:latin typeface="Courier New" panose="02070309020205020404" pitchFamily="49" charset="0"/>
+                <a:cs typeface="Courier New" panose="02070309020205020404" pitchFamily="49" charset="0"/>
+              </a:rPr>
+              <a:t>01:00 PM – 16:00 PM</a:t>
+            </a:r>
+            <a:r>
+              <a:rPr lang="en-US" sz="4400" dirty="0">
+                <a:solidFill>
+                  <a:schemeClr val="tx1"/>
+                </a:solidFill>
+                <a:latin typeface="Courier New" panose="02070309020205020404" pitchFamily="49" charset="0"/>
+                <a:cs typeface="Courier New" panose="02070309020205020404" pitchFamily="49" charset="0"/>
+              </a:rPr>
+              <a:t> 	</a:t>
+            </a:r>
+            <a:r>
+              <a:rPr lang="en-US" sz="4400" b="0" i="0" dirty="0">
+                <a:solidFill>
+                  <a:schemeClr val="tx1"/>
                 </a:solidFill>
                 <a:effectLst/>
-                <a:latin typeface="WeblySleek UI"/>
-              </a:rPr>
-              <a:t>AM</a:t>
-            </a:r>
-            <a:r>
-              <a:rPr lang="en-US" sz="3600" dirty="0">
-                <a:solidFill>
-                  <a:srgbClr val="76828A"/>
-                </a:solidFill>
-                <a:latin typeface="WeblySleek UI"/>
-              </a:rPr>
-              <a:t> </a:t>
-            </a:r>
-            <a:r>
-              <a:rPr lang="en-US" sz="3600" b="0" i="0" dirty="0">
-                <a:solidFill>
-                  <a:srgbClr val="4E5758"/>
-                </a:solidFill>
-                <a:effectLst/>
-                <a:latin typeface="WeblySleek UI"/>
-              </a:rPr>
-              <a:t>Cross-platform </a:t>
-            </a:r>
-            <a:r>
-              <a:rPr lang="en-US" sz="3600" b="0" i="0" dirty="0" err="1">
-                <a:solidFill>
-                  <a:srgbClr val="4E5758"/>
-                </a:solidFill>
-                <a:effectLst/>
-                <a:latin typeface="WeblySleek UI"/>
-              </a:rPr>
-              <a:t>Xamarin</a:t>
-            </a:r>
-            <a:r>
-              <a:rPr lang="en-US" sz="3600" b="0" i="0" dirty="0">
-                <a:solidFill>
-                  <a:srgbClr val="4E5758"/>
-                </a:solidFill>
-                <a:effectLst/>
-                <a:latin typeface="WeblySleek UI"/>
-              </a:rPr>
-              <a:t> presentation</a:t>
-            </a:r>
-          </a:p>
-          <a:p>
-            <a:r>
-              <a:rPr lang="en-US" sz="3600" b="0" i="0" dirty="0">
-                <a:solidFill>
-                  <a:srgbClr val="76828A"/>
-                </a:solidFill>
-                <a:effectLst/>
-                <a:latin typeface="WeblySleek UI"/>
-              </a:rPr>
-              <a:t>11:10 </a:t>
-            </a:r>
-            <a:r>
-              <a:rPr lang="en-US" sz="3600" b="0" i="0" dirty="0">
-                <a:solidFill>
-                  <a:srgbClr val="9AA4AB"/>
-                </a:solidFill>
-                <a:effectLst/>
-                <a:latin typeface="WeblySleek UI"/>
-              </a:rPr>
-              <a:t>AM</a:t>
-            </a:r>
-            <a:r>
-              <a:rPr lang="en-US" sz="3600" b="0" i="0" dirty="0">
-                <a:solidFill>
-                  <a:srgbClr val="76828A"/>
-                </a:solidFill>
-                <a:effectLst/>
-                <a:latin typeface="WeblySleek UI"/>
-              </a:rPr>
-              <a:t> – 11:50 </a:t>
-            </a:r>
-            <a:r>
-              <a:rPr lang="en-US" sz="3600" b="0" i="0" dirty="0">
-                <a:solidFill>
-                  <a:srgbClr val="9AA4AB"/>
-                </a:solidFill>
-                <a:effectLst/>
-                <a:latin typeface="WeblySleek UI"/>
-              </a:rPr>
-              <a:t>AM</a:t>
-            </a:r>
-            <a:r>
-              <a:rPr lang="en-US" sz="3600" dirty="0">
-                <a:solidFill>
-                  <a:srgbClr val="76828A"/>
-                </a:solidFill>
-                <a:latin typeface="WeblySleek UI"/>
-              </a:rPr>
-              <a:t> </a:t>
-            </a:r>
-            <a:r>
-              <a:rPr lang="en-US" sz="3600" b="0" i="0" dirty="0">
-                <a:solidFill>
-                  <a:srgbClr val="4E5758"/>
-                </a:solidFill>
-                <a:effectLst/>
-                <a:latin typeface="WeblySleek UI"/>
-              </a:rPr>
-              <a:t>Cloud </a:t>
-            </a:r>
-            <a:r>
-              <a:rPr lang="en-US" sz="3600" b="0" i="0" dirty="0" err="1">
-                <a:solidFill>
-                  <a:srgbClr val="4E5758"/>
-                </a:solidFill>
-                <a:effectLst/>
-                <a:latin typeface="WeblySleek UI"/>
-              </a:rPr>
-              <a:t>Xamarin</a:t>
-            </a:r>
-            <a:r>
-              <a:rPr lang="en-US" sz="3600" b="0" i="0" dirty="0">
-                <a:solidFill>
-                  <a:srgbClr val="4E5758"/>
-                </a:solidFill>
-                <a:effectLst/>
-                <a:latin typeface="WeblySleek UI"/>
-              </a:rPr>
-              <a:t> presentation</a:t>
-            </a:r>
-          </a:p>
-          <a:p>
-            <a:r>
-              <a:rPr lang="en-US" sz="3600" b="0" i="0" dirty="0">
-                <a:solidFill>
-                  <a:srgbClr val="76828A"/>
-                </a:solidFill>
-                <a:effectLst/>
-                <a:latin typeface="WeblySleek UI"/>
-              </a:rPr>
-              <a:t>12:00 </a:t>
-            </a:r>
-            <a:r>
-              <a:rPr lang="en-US" sz="3600" b="0" i="0" dirty="0">
-                <a:solidFill>
-                  <a:srgbClr val="9AA4AB"/>
-                </a:solidFill>
-                <a:effectLst/>
-                <a:latin typeface="WeblySleek UI"/>
-              </a:rPr>
-              <a:t>PM</a:t>
-            </a:r>
-            <a:r>
-              <a:rPr lang="en-US" sz="3600" b="0" i="0" dirty="0">
-                <a:solidFill>
-                  <a:srgbClr val="76828A"/>
-                </a:solidFill>
-                <a:effectLst/>
-                <a:latin typeface="WeblySleek UI"/>
-              </a:rPr>
-              <a:t> – 1:00 </a:t>
-            </a:r>
-            <a:r>
-              <a:rPr lang="en-US" sz="3600" b="0" i="0" dirty="0">
-                <a:solidFill>
-                  <a:srgbClr val="9AA4AB"/>
-                </a:solidFill>
-                <a:effectLst/>
-                <a:latin typeface="WeblySleek UI"/>
-              </a:rPr>
-              <a:t>PM</a:t>
-            </a:r>
-            <a:endParaRPr lang="en-US" sz="3600" b="0" i="0" dirty="0">
-              <a:solidFill>
-                <a:srgbClr val="76828A"/>
-              </a:solidFill>
-              <a:effectLst/>
-              <a:latin typeface="WeblySleek UI"/>
-            </a:endParaRPr>
-          </a:p>
-          <a:p>
-            <a:r>
-              <a:rPr lang="en-US" sz="3600" b="0" i="0" dirty="0">
-                <a:solidFill>
-                  <a:srgbClr val="4E5758"/>
-                </a:solidFill>
-                <a:effectLst/>
-                <a:latin typeface="WeblySleek UI"/>
-              </a:rPr>
-              <a:t>Lunch</a:t>
-            </a:r>
-          </a:p>
-          <a:p>
-            <a:r>
-              <a:rPr lang="en-US" sz="3600" b="0" i="0" dirty="0">
-                <a:solidFill>
-                  <a:srgbClr val="76828A"/>
-                </a:solidFill>
-                <a:effectLst/>
-                <a:latin typeface="WeblySleek UI"/>
-              </a:rPr>
-              <a:t>1:00 </a:t>
-            </a:r>
-            <a:r>
-              <a:rPr lang="en-US" sz="3600" b="0" i="0" dirty="0">
-                <a:solidFill>
-                  <a:srgbClr val="9AA4AB"/>
-                </a:solidFill>
-                <a:effectLst/>
-                <a:latin typeface="WeblySleek UI"/>
-              </a:rPr>
-              <a:t>PM</a:t>
-            </a:r>
-            <a:r>
-              <a:rPr lang="en-US" sz="3600" b="0" i="0" dirty="0">
-                <a:solidFill>
-                  <a:srgbClr val="76828A"/>
-                </a:solidFill>
-                <a:effectLst/>
-                <a:latin typeface="WeblySleek UI"/>
-              </a:rPr>
-              <a:t> – 4:00 </a:t>
-            </a:r>
-            <a:r>
-              <a:rPr lang="en-US" sz="3600" b="0" i="0" dirty="0">
-                <a:solidFill>
-                  <a:srgbClr val="9AA4AB"/>
-                </a:solidFill>
-                <a:effectLst/>
-                <a:latin typeface="WeblySleek UI"/>
-              </a:rPr>
-              <a:t>PM</a:t>
-            </a:r>
-            <a:endParaRPr lang="en-US" sz="3600" b="0" i="0" dirty="0">
-              <a:solidFill>
-                <a:srgbClr val="76828A"/>
-              </a:solidFill>
-              <a:effectLst/>
-              <a:latin typeface="WeblySleek UI"/>
-            </a:endParaRPr>
-          </a:p>
-          <a:p>
-            <a:r>
-              <a:rPr lang="en-US" sz="3600" b="0" i="0" dirty="0">
-                <a:solidFill>
-                  <a:srgbClr val="4E5758"/>
-                </a:solidFill>
-                <a:effectLst/>
-                <a:latin typeface="WeblySleek UI"/>
+                <a:latin typeface="Courier New" panose="02070309020205020404" pitchFamily="49" charset="0"/>
+                <a:cs typeface="Courier New" panose="02070309020205020404" pitchFamily="49" charset="0"/>
               </a:rPr>
               <a:t>Hackathon Challenge Walkthrough</a:t>
             </a:r>
           </a:p>
           <a:p>
             <a:pPr algn="l"/>
-            <a:endParaRPr lang="en-US" sz="3600" dirty="0"/>
+            <a:endParaRPr lang="en-US" sz="4400" dirty="0"/>
+          </a:p>
+        </p:txBody>
+      </p:sp>
+      <p:sp>
+        <p:nvSpPr>
+          <p:cNvPr id="10" name="TextBox 9"/>
+          <p:cNvSpPr txBox="1"/>
+          <p:nvPr/>
+        </p:nvSpPr>
+        <p:spPr>
+          <a:xfrm>
+            <a:off x="16472357" y="11112520"/>
+            <a:ext cx="5574926" cy="837870"/>
+          </a:xfrm>
+          <a:prstGeom prst="rect">
+            <a:avLst/>
+          </a:prstGeom>
+          <a:noFill/>
+        </p:spPr>
+        <p:txBody>
+          <a:bodyPr wrap="square">
+            <a:spAutoFit/>
+          </a:bodyPr>
+          <a:lstStyle/>
+          <a:p>
+            <a:r>
+              <a:rPr lang="en-US" sz="4800" b="0" i="0" u="none" strike="noStrike" cap="none" dirty="0">
+                <a:solidFill>
+                  <a:srgbClr val="18B4E2"/>
+                </a:solidFill>
+                <a:latin typeface="Quattrocento Sans"/>
+                <a:ea typeface="Quattrocento Sans"/>
+                <a:cs typeface="Quattrocento Sans"/>
+                <a:sym typeface="Quattrocento Sans"/>
+              </a:rPr>
+              <a:t>#</a:t>
+            </a:r>
+            <a:r>
+              <a:rPr lang="en-US" sz="4800" b="0" i="0" u="none" strike="noStrike" cap="none" dirty="0" err="1">
+                <a:solidFill>
+                  <a:srgbClr val="18B4E2"/>
+                </a:solidFill>
+                <a:latin typeface="Quattrocento Sans"/>
+                <a:ea typeface="Quattrocento Sans"/>
+                <a:cs typeface="Quattrocento Sans"/>
+                <a:sym typeface="Quattrocento Sans"/>
+              </a:rPr>
+              <a:t>XamarinDevDays</a:t>
+            </a:r>
+            <a:endParaRPr lang="en-US" sz="4800" dirty="0"/>
           </a:p>
         </p:txBody>
       </p:sp>

</xml_diff>